<commit_message>
Added progree presentation. Added small docs about csv format for analysis. Added 2 graphs to analysis with excel data. Output is now containing: settings, sent (not working), received, gentime, insert time, requests sent, received and responded to (not done yet).
</commit_message>
<xml_diff>
--- a/documentation/progress report/raceTracePresentation.pptx
+++ b/documentation/progress report/raceTracePresentation.pptx
@@ -19898,7 +19898,9 @@
         </p:nvSpPr>
         <p:spPr/>
         <p:txBody>
-          <a:bodyPr/>
+          <a:bodyPr>
+            <a:normAutofit/>
+          </a:bodyPr>
           <a:lstStyle/>
           <a:p>
             <a:r>
@@ -19908,6 +19910,13 @@
             <a:r>
               <a:rPr lang="en-GB" dirty="0" smtClean="0"/>
               <a:t>eal-time group tracking app</a:t>
+            </a:r>
+            <a:endParaRPr lang="en-GB" dirty="0" smtClean="0"/>
+          </a:p>
+          <a:p>
+            <a:r>
+              <a:rPr lang="en-GB" dirty="0" smtClean="0"/>
+              <a:t>John Knox</a:t>
             </a:r>
             <a:endParaRPr lang="en-GB" dirty="0"/>
           </a:p>

</xml_diff>